<commit_message>
Various edits based on Ed's comments.
</commit_message>
<xml_diff>
--- a/figs_src/diagrams-arial.pptx
+++ b/figs_src/diagrams-arial.pptx
@@ -3687,8 +3687,15 @@
                 <a:latin typeface="Arial" pitchFamily="34" charset="0"/>
                 <a:cs typeface="Arial" pitchFamily="34" charset="0"/>
               </a:rPr>
-              <a:t>Metadata</a:t>
-            </a:r>
+              <a:t>Memory Metadata</a:t>
+            </a:r>
+            <a:endParaRPr lang="en-US" sz="800" dirty="0" smtClean="0">
+              <a:solidFill>
+                <a:schemeClr val="tx1"/>
+              </a:solidFill>
+              <a:latin typeface="Arial" pitchFamily="34" charset="0"/>
+              <a:cs typeface="Arial" pitchFamily="34" charset="0"/>
+            </a:endParaRPr>
           </a:p>
         </p:txBody>
       </p:sp>
@@ -3821,17 +3828,7 @@
                 <a:latin typeface="Arial" pitchFamily="34" charset="0"/>
                 <a:cs typeface="Arial" pitchFamily="34" charset="0"/>
               </a:rPr>
-              <a:t>Main </a:t>
-            </a:r>
-            <a:r>
-              <a:rPr lang="en-US" sz="800" dirty="0" smtClean="0">
-                <a:solidFill>
-                  <a:schemeClr val="tx1"/>
-                </a:solidFill>
-                <a:latin typeface="Arial" pitchFamily="34" charset="0"/>
-                <a:cs typeface="Arial" pitchFamily="34" charset="0"/>
-              </a:rPr>
-              <a:t>Core</a:t>
+              <a:t>Main Core</a:t>
             </a:r>
           </a:p>
           <a:p>
@@ -4033,13 +4030,6 @@
               </a:rPr>
               <a:t>RF Metadata</a:t>
             </a:r>
-            <a:endParaRPr lang="en-US" sz="800" dirty="0" smtClean="0">
-              <a:solidFill>
-                <a:schemeClr val="tx1"/>
-              </a:solidFill>
-              <a:latin typeface="Arial" pitchFamily="34" charset="0"/>
-              <a:cs typeface="Arial" pitchFamily="34" charset="0"/>
-            </a:endParaRPr>
           </a:p>
         </p:txBody>
       </p:sp>
@@ -4097,13 +4087,6 @@
               </a:rPr>
               <a:t>RF Metadata</a:t>
             </a:r>
-            <a:endParaRPr lang="en-US" sz="800" dirty="0" smtClean="0">
-              <a:solidFill>
-                <a:schemeClr val="tx1"/>
-              </a:solidFill>
-              <a:latin typeface="Arial" pitchFamily="34" charset="0"/>
-              <a:cs typeface="Arial" pitchFamily="34" charset="0"/>
-            </a:endParaRPr>
           </a:p>
         </p:txBody>
       </p:sp>
@@ -4244,6 +4227,13 @@
               </a:rPr>
               <a:t>Engine</a:t>
             </a:r>
+            <a:endParaRPr lang="en-US" sz="800" dirty="0" smtClean="0">
+              <a:solidFill>
+                <a:schemeClr val="tx1"/>
+              </a:solidFill>
+              <a:latin typeface="Arial" pitchFamily="34" charset="0"/>
+              <a:cs typeface="Arial" pitchFamily="34" charset="0"/>
+            </a:endParaRPr>
           </a:p>
         </p:txBody>
       </p:sp>
@@ -4623,15 +4613,22 @@
           <a:p>
             <a:pPr algn="ctr"/>
             <a:r>
-              <a:rPr lang="en-US" sz="800" dirty="0" smtClean="0">
+              <a:rPr lang="en-US" sz="800" smtClean="0">
                 <a:solidFill>
                   <a:schemeClr val="tx1"/>
                 </a:solidFill>
                 <a:latin typeface="Arial" pitchFamily="34" charset="0"/>
                 <a:cs typeface="Arial" pitchFamily="34" charset="0"/>
               </a:rPr>
-              <a:t>Monitoring Core</a:t>
-            </a:r>
+              <a:t>Monitor</a:t>
+            </a:r>
+            <a:endParaRPr lang="en-US" sz="800" dirty="0" smtClean="0">
+              <a:solidFill>
+                <a:schemeClr val="tx1"/>
+              </a:solidFill>
+              <a:latin typeface="Arial" pitchFamily="34" charset="0"/>
+              <a:cs typeface="Arial" pitchFamily="34" charset="0"/>
+            </a:endParaRPr>
           </a:p>
         </p:txBody>
       </p:sp>

</xml_diff>

<commit_message>
Various edits based on a full pass.
</commit_message>
<xml_diff>
--- a/figs_src/diagrams-arial.pptx
+++ b/figs_src/diagrams-arial.pptx
@@ -3689,13 +3689,6 @@
               </a:rPr>
               <a:t>Memory Metadata</a:t>
             </a:r>
-            <a:endParaRPr lang="en-US" sz="800" dirty="0" smtClean="0">
-              <a:solidFill>
-                <a:schemeClr val="tx1"/>
-              </a:solidFill>
-              <a:latin typeface="Arial" pitchFamily="34" charset="0"/>
-              <a:cs typeface="Arial" pitchFamily="34" charset="0"/>
-            </a:endParaRPr>
           </a:p>
         </p:txBody>
       </p:sp>
@@ -4078,15 +4071,22 @@
           <a:p>
             <a:pPr algn="ctr"/>
             <a:r>
-              <a:rPr lang="en-US" sz="800" dirty="0" smtClean="0">
+              <a:rPr lang="en-US" sz="800" smtClean="0">
                 <a:solidFill>
                   <a:schemeClr val="tx1"/>
                 </a:solidFill>
                 <a:latin typeface="Arial" pitchFamily="34" charset="0"/>
                 <a:cs typeface="Arial" pitchFamily="34" charset="0"/>
               </a:rPr>
-              <a:t>RF Metadata</a:t>
-            </a:r>
+              <a:t>Register File</a:t>
+            </a:r>
+            <a:endParaRPr lang="en-US" sz="800" dirty="0" smtClean="0">
+              <a:solidFill>
+                <a:schemeClr val="tx1"/>
+              </a:solidFill>
+              <a:latin typeface="Arial" pitchFamily="34" charset="0"/>
+              <a:cs typeface="Arial" pitchFamily="34" charset="0"/>
+            </a:endParaRPr>
           </a:p>
         </p:txBody>
       </p:sp>
@@ -4227,13 +4227,6 @@
               </a:rPr>
               <a:t>Engine</a:t>
             </a:r>
-            <a:endParaRPr lang="en-US" sz="800" dirty="0" smtClean="0">
-              <a:solidFill>
-                <a:schemeClr val="tx1"/>
-              </a:solidFill>
-              <a:latin typeface="Arial" pitchFamily="34" charset="0"/>
-              <a:cs typeface="Arial" pitchFamily="34" charset="0"/>
-            </a:endParaRPr>
           </a:p>
         </p:txBody>
       </p:sp>

</xml_diff>